<commit_message>
added new components and bug fixes
</commit_message>
<xml_diff>
--- a/Presentations/Learning_v2.pptx
+++ b/Presentations/Learning_v2.pptx
@@ -216,7 +216,7 @@
           <a:p>
             <a:fld id="{CC81CEE1-0635-477E-8A37-9F789A21862F}" type="datetimeFigureOut">
               <a:rPr lang="en-US" smtClean="0"/>
-              <a:t>3/1/2020</a:t>
+              <a:t>4/22/2020</a:t>
             </a:fld>
             <a:endParaRPr lang="en-US"/>
           </a:p>
@@ -1358,7 +1358,7 @@
           <a:p>
             <a:fld id="{75808892-DE2C-49D6-B8F5-A22771A1678B}" type="datetimeFigureOut">
               <a:rPr lang="en-US" smtClean="0"/>
-              <a:t>3/1/2020</a:t>
+              <a:t>4/22/2020</a:t>
             </a:fld>
             <a:endParaRPr lang="en-US"/>
           </a:p>
@@ -1690,7 +1690,7 @@
           <a:p>
             <a:fld id="{75808892-DE2C-49D6-B8F5-A22771A1678B}" type="datetimeFigureOut">
               <a:rPr lang="en-US" smtClean="0"/>
-              <a:t>3/1/2020</a:t>
+              <a:t>4/22/2020</a:t>
             </a:fld>
             <a:endParaRPr lang="en-US"/>
           </a:p>
@@ -1886,7 +1886,7 @@
           <a:p>
             <a:fld id="{75808892-DE2C-49D6-B8F5-A22771A1678B}" type="datetimeFigureOut">
               <a:rPr lang="en-US" smtClean="0"/>
-              <a:t>3/1/2020</a:t>
+              <a:t>4/22/2020</a:t>
             </a:fld>
             <a:endParaRPr lang="en-US"/>
           </a:p>
@@ -2156,7 +2156,7 @@
           <a:p>
             <a:fld id="{75808892-DE2C-49D6-B8F5-A22771A1678B}" type="datetimeFigureOut">
               <a:rPr lang="en-US" smtClean="0"/>
-              <a:t>3/1/2020</a:t>
+              <a:t>4/22/2020</a:t>
             </a:fld>
             <a:endParaRPr lang="en-US"/>
           </a:p>
@@ -2584,7 +2584,7 @@
           <a:p>
             <a:fld id="{75808892-DE2C-49D6-B8F5-A22771A1678B}" type="datetimeFigureOut">
               <a:rPr lang="en-US" smtClean="0"/>
-              <a:t>3/1/2020</a:t>
+              <a:t>4/22/2020</a:t>
             </a:fld>
             <a:endParaRPr lang="en-US"/>
           </a:p>
@@ -3134,7 +3134,7 @@
           <a:p>
             <a:fld id="{75808892-DE2C-49D6-B8F5-A22771A1678B}" type="datetimeFigureOut">
               <a:rPr lang="en-US" smtClean="0"/>
-              <a:t>3/1/2020</a:t>
+              <a:t>4/22/2020</a:t>
             </a:fld>
             <a:endParaRPr lang="en-US"/>
           </a:p>
@@ -3924,7 +3924,7 @@
           <a:p>
             <a:fld id="{75808892-DE2C-49D6-B8F5-A22771A1678B}" type="datetimeFigureOut">
               <a:rPr lang="en-US" smtClean="0"/>
-              <a:t>3/1/2020</a:t>
+              <a:t>4/22/2020</a:t>
             </a:fld>
             <a:endParaRPr lang="en-US"/>
           </a:p>
@@ -4103,7 +4103,7 @@
           <a:p>
             <a:fld id="{75808892-DE2C-49D6-B8F5-A22771A1678B}" type="datetimeFigureOut">
               <a:rPr lang="en-US" smtClean="0"/>
-              <a:t>3/1/2020</a:t>
+              <a:t>4/22/2020</a:t>
             </a:fld>
             <a:endParaRPr lang="en-US"/>
           </a:p>
@@ -4287,7 +4287,7 @@
           <a:p>
             <a:fld id="{75808892-DE2C-49D6-B8F5-A22771A1678B}" type="datetimeFigureOut">
               <a:rPr lang="en-US" smtClean="0"/>
-              <a:t>3/1/2020</a:t>
+              <a:t>4/22/2020</a:t>
             </a:fld>
             <a:endParaRPr lang="en-US"/>
           </a:p>
@@ -4462,7 +4462,7 @@
           <a:p>
             <a:fld id="{75808892-DE2C-49D6-B8F5-A22771A1678B}" type="datetimeFigureOut">
               <a:rPr lang="en-US" smtClean="0"/>
-              <a:t>3/1/2020</a:t>
+              <a:t>4/22/2020</a:t>
             </a:fld>
             <a:endParaRPr lang="en-US"/>
           </a:p>
@@ -4712,7 +4712,7 @@
           <a:p>
             <a:fld id="{75808892-DE2C-49D6-B8F5-A22771A1678B}" type="datetimeFigureOut">
               <a:rPr lang="en-US" smtClean="0"/>
-              <a:t>3/1/2020</a:t>
+              <a:t>4/22/2020</a:t>
             </a:fld>
             <a:endParaRPr lang="en-US"/>
           </a:p>
@@ -4949,7 +4949,7 @@
           <a:p>
             <a:fld id="{75808892-DE2C-49D6-B8F5-A22771A1678B}" type="datetimeFigureOut">
               <a:rPr lang="en-US" smtClean="0"/>
-              <a:t>3/1/2020</a:t>
+              <a:t>4/22/2020</a:t>
             </a:fld>
             <a:endParaRPr lang="en-US"/>
           </a:p>
@@ -5334,7 +5334,7 @@
           <a:p>
             <a:fld id="{75808892-DE2C-49D6-B8F5-A22771A1678B}" type="datetimeFigureOut">
               <a:rPr lang="en-US" smtClean="0"/>
-              <a:t>3/1/2020</a:t>
+              <a:t>4/22/2020</a:t>
             </a:fld>
             <a:endParaRPr lang="en-US"/>
           </a:p>
@@ -5452,7 +5452,7 @@
           <a:p>
             <a:fld id="{75808892-DE2C-49D6-B8F5-A22771A1678B}" type="datetimeFigureOut">
               <a:rPr lang="en-US" smtClean="0"/>
-              <a:t>3/1/2020</a:t>
+              <a:t>4/22/2020</a:t>
             </a:fld>
             <a:endParaRPr lang="en-US"/>
           </a:p>
@@ -5547,7 +5547,7 @@
           <a:p>
             <a:fld id="{75808892-DE2C-49D6-B8F5-A22771A1678B}" type="datetimeFigureOut">
               <a:rPr lang="en-US" smtClean="0"/>
-              <a:t>3/1/2020</a:t>
+              <a:t>4/22/2020</a:t>
             </a:fld>
             <a:endParaRPr lang="en-US"/>
           </a:p>
@@ -5800,7 +5800,7 @@
           <a:p>
             <a:fld id="{75808892-DE2C-49D6-B8F5-A22771A1678B}" type="datetimeFigureOut">
               <a:rPr lang="en-US" smtClean="0"/>
-              <a:t>3/1/2020</a:t>
+              <a:t>4/22/2020</a:t>
             </a:fld>
             <a:endParaRPr lang="en-US"/>
           </a:p>
@@ -6069,7 +6069,7 @@
           <a:p>
             <a:fld id="{75808892-DE2C-49D6-B8F5-A22771A1678B}" type="datetimeFigureOut">
               <a:rPr lang="en-US" smtClean="0"/>
-              <a:t>3/1/2020</a:t>
+              <a:t>4/22/2020</a:t>
             </a:fld>
             <a:endParaRPr lang="en-US"/>
           </a:p>
@@ -6472,7 +6472,7 @@
           <a:p>
             <a:fld id="{75808892-DE2C-49D6-B8F5-A22771A1678B}" type="datetimeFigureOut">
               <a:rPr lang="en-US" smtClean="0"/>
-              <a:t>3/1/2020</a:t>
+              <a:t>4/22/2020</a:t>
             </a:fld>
             <a:endParaRPr lang="en-US"/>
           </a:p>

</xml_diff>